<commit_message>
o3 did something here; will come back later to see which are the things I want to preserve
</commit_message>
<xml_diff>
--- a/output/test_output.pptx
+++ b/output/test_output.pptx
@@ -3096,8 +3096,8 @@
         </p:nvSpPr>
         <p:spPr>
           <a:xfrm>
-            <a:off x="400050" y="380999"/>
-            <a:ext cx="1352549" cy="476249"/>
+            <a:off x="200025" y="380999"/>
+            <a:ext cx="8943975" cy="274320"/>
           </a:xfrm>
           <a:prstGeom prst="rect">
             <a:avLst/>
@@ -3114,6 +3114,12 @@
               <a:lnSpc>
                 <a:spcPct val="140000"/>
               </a:lnSpc>
+              <a:spcBef>
+                <a:spcPts val="0"/>
+              </a:spcBef>
+              <a:spcAft>
+                <a:spcPts val="1500"/>
+              </a:spcAft>
               <a:defRPr>
                 <a:solidFill>
                   <a:srgbClr val="000000"/>
@@ -3121,7 +3127,9 @@
               </a:defRPr>
             </a:pPr>
             <a:r>
-              <a:rPr sz="2700" b="1"/>
+              <a:rPr sz="1200" b="1">
+                <a:latin typeface="Arial"/>
+              </a:rPr>
               <a:t>Heading</a:t>
             </a:r>
           </a:p>
@@ -3135,8 +3143,8 @@
         </p:nvSpPr>
         <p:spPr>
           <a:xfrm>
-            <a:off x="400050" y="1047749"/>
-            <a:ext cx="8343900" cy="3352800"/>
+            <a:off x="200025" y="838200"/>
+            <a:ext cx="8943975" cy="933449"/>
           </a:xfrm>
           <a:prstGeom prst="rect">
             <a:avLst/>
@@ -3153,6 +3161,12 @@
               <a:lnSpc>
                 <a:spcPct val="140000"/>
               </a:lnSpc>
+              <a:spcBef>
+                <a:spcPts val="0"/>
+              </a:spcBef>
+              <a:spcAft>
+                <a:spcPts val="0"/>
+              </a:spcAft>
               <a:defRPr>
                 <a:solidFill>
                   <a:srgbClr val="000000"/>
@@ -3160,7 +3174,9 @@
               </a:defRPr>
             </a:pPr>
             <a:r>
-              <a:rPr sz="1300"/>
+              <a:rPr sz="1000">
+                <a:latin typeface="Arial"/>
+              </a:rPr>
               <a:t>Very long line Very long line Very long line Very long line Very long line Very long line Very long line Very long line Very long line Very long line Very long line Very long line Very long line Very long line Very long line Very long line Very long line Very long line Very long line Very long line Very long line Very long line Very long line Very long line Very long line Very long line Very long line Very long line Very long line Very long line Very long line Very long line Very long line Very long line Very long line Very long line Very long line Very long line Very long line Very long line Very long line Very long line Very long line Very long line Very long line Very long line Very long line Very long line Very long line Very long line Very long line Very long line Very long line Very long line Very long line Very long line Very long line Very long line Very long line Very long line Very long line Very long line Very long line Very long line Very long line Very long line Very long line Very long line Very long line Very long line Very long line Very long line Very long line Very long line Very long line Very long line Very long line Very long line Very long line Very long line Very long line Very long line Very long line Very long line Very long line Very long line Very long line Very long line Very long line Very long line Very long line Very long line Very long line Very long line Very long line Very long line Very long line Very long line Very long line Very long line</a:t>
             </a:r>
           </a:p>

</xml_diff>